<commit_message>
Updated w/ old and new data
</commit_message>
<xml_diff>
--- a/Report/M214A Project Presentation.pptx
+++ b/Report/M214A Project Presentation.pptx
@@ -15,6 +15,7 @@
     <p:sldId id="265" r:id="rId9"/>
     <p:sldId id="267" r:id="rId10"/>
     <p:sldId id="268" r:id="rId11"/>
+    <p:sldId id="269" r:id="rId12"/>
   </p:sldIdLst>
   <p:sldSz cx="9144000" cy="6858000" type="screen4x3"/>
   <p:notesSz cx="6858000" cy="9144000"/>
@@ -325,7 +326,7 @@
           <a:p>
             <a:fld id="{612DDFCF-265E-432B-B606-ECD158BAEB37}" type="datetimeFigureOut">
               <a:rPr lang="en-US" smtClean="0"/>
-              <a:t>3/9/2019</a:t>
+              <a:t>3/11/2019</a:t>
             </a:fld>
             <a:endParaRPr lang="en-US"/>
           </a:p>
@@ -588,7 +589,7 @@
           <a:p>
             <a:fld id="{612DDFCF-265E-432B-B606-ECD158BAEB37}" type="datetimeFigureOut">
               <a:rPr lang="en-US" smtClean="0"/>
-              <a:t>3/9/2019</a:t>
+              <a:t>3/11/2019</a:t>
             </a:fld>
             <a:endParaRPr lang="en-US"/>
           </a:p>
@@ -761,7 +762,7 @@
           <a:p>
             <a:fld id="{612DDFCF-265E-432B-B606-ECD158BAEB37}" type="datetimeFigureOut">
               <a:rPr lang="en-US" smtClean="0"/>
-              <a:t>3/9/2019</a:t>
+              <a:t>3/11/2019</a:t>
             </a:fld>
             <a:endParaRPr lang="en-US"/>
           </a:p>
@@ -925,7 +926,7 @@
           <a:p>
             <a:fld id="{612DDFCF-265E-432B-B606-ECD158BAEB37}" type="datetimeFigureOut">
               <a:rPr lang="en-US" smtClean="0"/>
-              <a:t>3/9/2019</a:t>
+              <a:t>3/11/2019</a:t>
             </a:fld>
             <a:endParaRPr lang="en-US"/>
           </a:p>
@@ -1174,7 +1175,7 @@
           <a:p>
             <a:fld id="{612DDFCF-265E-432B-B606-ECD158BAEB37}" type="datetimeFigureOut">
               <a:rPr lang="en-US" smtClean="0"/>
-              <a:t>3/9/2019</a:t>
+              <a:t>3/11/2019</a:t>
             </a:fld>
             <a:endParaRPr lang="en-US"/>
           </a:p>
@@ -1456,7 +1457,7 @@
           <a:p>
             <a:fld id="{612DDFCF-265E-432B-B606-ECD158BAEB37}" type="datetimeFigureOut">
               <a:rPr lang="en-US" smtClean="0"/>
-              <a:t>3/9/2019</a:t>
+              <a:t>3/11/2019</a:t>
             </a:fld>
             <a:endParaRPr lang="en-US"/>
           </a:p>
@@ -1894,7 +1895,7 @@
           <a:p>
             <a:fld id="{612DDFCF-265E-432B-B606-ECD158BAEB37}" type="datetimeFigureOut">
               <a:rPr lang="en-US" smtClean="0"/>
-              <a:t>3/9/2019</a:t>
+              <a:t>3/11/2019</a:t>
             </a:fld>
             <a:endParaRPr lang="en-US"/>
           </a:p>
@@ -2006,7 +2007,7 @@
           <a:p>
             <a:fld id="{612DDFCF-265E-432B-B606-ECD158BAEB37}" type="datetimeFigureOut">
               <a:rPr lang="en-US" smtClean="0"/>
-              <a:t>3/9/2019</a:t>
+              <a:t>3/11/2019</a:t>
             </a:fld>
             <a:endParaRPr lang="en-US"/>
           </a:p>
@@ -2096,7 +2097,7 @@
           <a:p>
             <a:fld id="{612DDFCF-265E-432B-B606-ECD158BAEB37}" type="datetimeFigureOut">
               <a:rPr lang="en-US" smtClean="0"/>
-              <a:t>3/9/2019</a:t>
+              <a:t>3/11/2019</a:t>
             </a:fld>
             <a:endParaRPr lang="en-US"/>
           </a:p>
@@ -2338,7 +2339,7 @@
           <a:p>
             <a:fld id="{612DDFCF-265E-432B-B606-ECD158BAEB37}" type="datetimeFigureOut">
               <a:rPr lang="en-US" smtClean="0"/>
-              <a:t>3/9/2019</a:t>
+              <a:t>3/11/2019</a:t>
             </a:fld>
             <a:endParaRPr lang="en-US"/>
           </a:p>
@@ -2630,7 +2631,7 @@
           <a:p>
             <a:fld id="{612DDFCF-265E-432B-B606-ECD158BAEB37}" type="datetimeFigureOut">
               <a:rPr lang="en-US" smtClean="0"/>
-              <a:t>3/9/2019</a:t>
+              <a:t>3/11/2019</a:t>
             </a:fld>
             <a:endParaRPr lang="en-US"/>
           </a:p>
@@ -2924,7 +2925,7 @@
           <a:p>
             <a:fld id="{612DDFCF-265E-432B-B606-ECD158BAEB37}" type="datetimeFigureOut">
               <a:rPr lang="en-US" smtClean="0"/>
-              <a:t>3/9/2019</a:t>
+              <a:t>3/11/2019</a:t>
             </a:fld>
             <a:endParaRPr lang="en-US"/>
           </a:p>
@@ -3429,6 +3430,10 @@
           <a:bodyPr anchor="t"/>
           <a:lstStyle/>
           <a:p>
+            <a:r>
+              <a:rPr lang="en-US" sz="2800" cap="small" dirty="0"/>
+              <a:t/>
+            </a:r>
             <a:br>
               <a:rPr lang="en-US" sz="2800" cap="small" dirty="0"/>
             </a:br>
@@ -3675,6 +3680,105 @@
 </p:sld>
 </file>
 
+<file path=ppt/slides/slide11.xml><?xml version="1.0" encoding="utf-8"?>
+<p:sld xmlns:a="http://schemas.openxmlformats.org/drawingml/2006/main" xmlns:r="http://schemas.openxmlformats.org/officeDocument/2006/relationships" xmlns:p="http://schemas.openxmlformats.org/presentationml/2006/main">
+  <p:cSld>
+    <p:spTree>
+      <p:nvGrpSpPr>
+        <p:cNvPr id="1" name=""/>
+        <p:cNvGrpSpPr/>
+        <p:nvPr/>
+      </p:nvGrpSpPr>
+      <p:grpSpPr>
+        <a:xfrm>
+          <a:off x="0" y="0"/>
+          <a:ext cx="0" cy="0"/>
+          <a:chOff x="0" y="0"/>
+          <a:chExt cx="0" cy="0"/>
+        </a:xfrm>
+      </p:grpSpPr>
+      <p:sp>
+        <p:nvSpPr>
+          <p:cNvPr id="2" name="Title 1"/>
+          <p:cNvSpPr>
+            <a:spLocks noGrp="1"/>
+          </p:cNvSpPr>
+          <p:nvPr>
+            <p:ph type="title"/>
+          </p:nvPr>
+        </p:nvSpPr>
+        <p:spPr>
+          <a:xfrm>
+            <a:off x="457200" y="455595"/>
+            <a:ext cx="7162800" cy="685482"/>
+          </a:xfrm>
+        </p:spPr>
+        <p:txBody>
+          <a:bodyPr anchor="t">
+            <a:normAutofit/>
+          </a:bodyPr>
+          <a:lstStyle/>
+          <a:p>
+            <a:r>
+              <a:rPr lang="en-US" sz="2800" b="1" cap="small" dirty="0" smtClean="0">
+                <a:solidFill>
+                  <a:schemeClr val="tx1"/>
+                </a:solidFill>
+              </a:rPr>
+              <a:t>Thank You</a:t>
+            </a:r>
+            <a:endParaRPr lang="en-US" sz="2000" b="1" cap="small" dirty="0">
+              <a:solidFill>
+                <a:schemeClr val="tx1"/>
+              </a:solidFill>
+            </a:endParaRPr>
+          </a:p>
+        </p:txBody>
+      </p:sp>
+      <p:cxnSp>
+        <p:nvCxnSpPr>
+          <p:cNvPr id="4" name="Straight Connector 3"/>
+          <p:cNvCxnSpPr/>
+          <p:nvPr/>
+        </p:nvCxnSpPr>
+        <p:spPr>
+          <a:xfrm>
+            <a:off x="0" y="1371600"/>
+            <a:ext cx="7848600" cy="0"/>
+          </a:xfrm>
+          <a:prstGeom prst="line">
+            <a:avLst/>
+          </a:prstGeom>
+          <a:ln w="57150"/>
+        </p:spPr>
+        <p:style>
+          <a:lnRef idx="1">
+            <a:schemeClr val="dk1"/>
+          </a:lnRef>
+          <a:fillRef idx="0">
+            <a:schemeClr val="dk1"/>
+          </a:fillRef>
+          <a:effectRef idx="0">
+            <a:schemeClr val="dk1"/>
+          </a:effectRef>
+          <a:fontRef idx="minor">
+            <a:schemeClr val="tx1"/>
+          </a:fontRef>
+        </p:style>
+      </p:cxnSp>
+    </p:spTree>
+    <p:extLst>
+      <p:ext uri="{BB962C8B-B14F-4D97-AF65-F5344CB8AC3E}">
+        <p14:creationId xmlns:p14="http://schemas.microsoft.com/office/powerpoint/2010/main" val="233211003"/>
+      </p:ext>
+    </p:extLst>
+  </p:cSld>
+  <p:clrMapOvr>
+    <a:masterClrMapping/>
+  </p:clrMapOvr>
+</p:sld>
+</file>
+
 <file path=ppt/slides/slide2.xml><?xml version="1.0" encoding="utf-8"?>
 <p:sld xmlns:a="http://schemas.openxmlformats.org/drawingml/2006/main" xmlns:r="http://schemas.openxmlformats.org/officeDocument/2006/relationships" xmlns:p="http://schemas.openxmlformats.org/presentationml/2006/main">
   <p:cSld>
@@ -3775,7 +3879,7 @@
               <a:buChar char="•"/>
             </a:pPr>
             <a:r>
-              <a:rPr lang="en-US" b="0" dirty="0"/>
+              <a:rPr lang="en-US" sz="2400" b="0" dirty="0"/>
               <a:t>MFCCs and Feature Extraction</a:t>
             </a:r>
           </a:p>
@@ -3785,7 +3889,7 @@
               <a:buChar char="•"/>
             </a:pPr>
             <a:r>
-              <a:rPr lang="en-US" b="0" dirty="0"/>
+              <a:rPr lang="en-US" sz="2400" b="0" dirty="0"/>
               <a:t>K-NN and Final Results</a:t>
             </a:r>
           </a:p>
@@ -3795,7 +3899,7 @@
               <a:buChar char="•"/>
             </a:pPr>
             <a:r>
-              <a:rPr lang="en-US" b="0" dirty="0"/>
+              <a:rPr lang="en-US" sz="2400" b="0" dirty="0"/>
               <a:t>Alternate Approach (Neural Networks)</a:t>
             </a:r>
           </a:p>
@@ -4117,7 +4221,7 @@
           <p:cNvPr id="22" name="Content Placeholder 21">
             <a:extLst>
               <a:ext uri="{FF2B5EF4-FFF2-40B4-BE49-F238E27FC236}">
-                <a16:creationId xmlns:a16="http://schemas.microsoft.com/office/drawing/2014/main" id="{D2A8039B-A7F6-4BDB-B1E2-5BC0B14CBB64}"/>
+                <a16:creationId xmlns:a16="http://schemas.microsoft.com/office/drawing/2014/main" xmlns="" id="{D2A8039B-A7F6-4BDB-B1E2-5BC0B14CBB64}"/>
               </a:ext>
             </a:extLst>
           </p:cNvPr>
@@ -4375,7 +4479,7 @@
           <p:cNvPr id="5" name="Picture 4">
             <a:extLst>
               <a:ext uri="{FF2B5EF4-FFF2-40B4-BE49-F238E27FC236}">
-                <a16:creationId xmlns:a16="http://schemas.microsoft.com/office/drawing/2014/main" id="{B74C2B2B-2022-4298-A200-6E40C0F909F1}"/>
+                <a16:creationId xmlns:a16="http://schemas.microsoft.com/office/drawing/2014/main" xmlns="" id="{B74C2B2B-2022-4298-A200-6E40C0F909F1}"/>
               </a:ext>
             </a:extLst>
           </p:cNvPr>
@@ -4392,7 +4496,7 @@
         </p:blipFill>
         <p:spPr>
           <a:xfrm>
-            <a:off x="2386012" y="5638481"/>
+            <a:off x="656926" y="5645012"/>
             <a:ext cx="4371975" cy="1028700"/>
           </a:xfrm>
           <a:prstGeom prst="rect">
@@ -4400,6 +4504,781 @@
           </a:prstGeom>
         </p:spPr>
       </p:pic>
+      <p:pic>
+        <p:nvPicPr>
+          <p:cNvPr id="14" name="Picture 13"/>
+          <p:cNvPicPr>
+            <a:picLocks noChangeAspect="1"/>
+          </p:cNvPicPr>
+          <p:nvPr/>
+        </p:nvPicPr>
+        <p:blipFill>
+          <a:blip r:embed="rId3"/>
+          <a:stretch>
+            <a:fillRect/>
+          </a:stretch>
+        </p:blipFill>
+        <p:spPr>
+          <a:xfrm>
+            <a:off x="457200" y="4666217"/>
+            <a:ext cx="4771429" cy="790476"/>
+          </a:xfrm>
+          <a:prstGeom prst="rect">
+            <a:avLst/>
+          </a:prstGeom>
+        </p:spPr>
+      </p:pic>
+      <p:grpSp>
+        <p:nvGrpSpPr>
+          <p:cNvPr id="15" name="Group 14"/>
+          <p:cNvGrpSpPr/>
+          <p:nvPr/>
+        </p:nvGrpSpPr>
+        <p:grpSpPr>
+          <a:xfrm>
+            <a:off x="5428355" y="5072341"/>
+            <a:ext cx="3200400" cy="1454950"/>
+            <a:chOff x="0" y="0"/>
+            <a:chExt cx="1806105" cy="1302550"/>
+          </a:xfrm>
+        </p:grpSpPr>
+        <p:cxnSp>
+          <p:nvCxnSpPr>
+            <p:cNvPr id="16" name="Straight Connector 15"/>
+            <p:cNvCxnSpPr/>
+            <p:nvPr/>
+          </p:nvCxnSpPr>
+          <p:spPr>
+            <a:xfrm>
+              <a:off x="147996" y="1199819"/>
+              <a:ext cx="1331958" cy="0"/>
+            </a:xfrm>
+            <a:prstGeom prst="line">
+              <a:avLst/>
+            </a:prstGeom>
+          </p:spPr>
+          <p:style>
+            <a:lnRef idx="1">
+              <a:schemeClr val="dk1"/>
+            </a:lnRef>
+            <a:fillRef idx="0">
+              <a:schemeClr val="dk1"/>
+            </a:fillRef>
+            <a:effectRef idx="0">
+              <a:schemeClr val="dk1"/>
+            </a:effectRef>
+            <a:fontRef idx="minor">
+              <a:schemeClr val="tx1"/>
+            </a:fontRef>
+          </p:style>
+        </p:cxnSp>
+        <p:grpSp>
+          <p:nvGrpSpPr>
+            <p:cNvPr id="17" name="Group 16"/>
+            <p:cNvGrpSpPr/>
+            <p:nvPr/>
+          </p:nvGrpSpPr>
+          <p:grpSpPr>
+            <a:xfrm>
+              <a:off x="0" y="0"/>
+              <a:ext cx="1806105" cy="1302550"/>
+              <a:chOff x="0" y="0"/>
+              <a:chExt cx="1806105" cy="1302550"/>
+            </a:xfrm>
+          </p:grpSpPr>
+          <p:cxnSp>
+            <p:nvCxnSpPr>
+              <p:cNvPr id="18" name="Straight Connector 17"/>
+              <p:cNvCxnSpPr/>
+              <p:nvPr/>
+            </p:nvCxnSpPr>
+            <p:spPr>
+              <a:xfrm>
+                <a:off x="147344" y="286021"/>
+                <a:ext cx="0" cy="915670"/>
+              </a:xfrm>
+              <a:prstGeom prst="line">
+                <a:avLst/>
+              </a:prstGeom>
+            </p:spPr>
+            <p:style>
+              <a:lnRef idx="1">
+                <a:schemeClr val="dk1"/>
+              </a:lnRef>
+              <a:fillRef idx="0">
+                <a:schemeClr val="dk1"/>
+              </a:fillRef>
+              <a:effectRef idx="0">
+                <a:schemeClr val="dk1"/>
+              </a:effectRef>
+              <a:fontRef idx="minor">
+                <a:schemeClr val="tx1"/>
+              </a:fontRef>
+            </p:style>
+          </p:cxnSp>
+          <p:sp>
+            <p:nvSpPr>
+              <p:cNvPr id="19" name="Text Box 337"/>
+              <p:cNvSpPr txBox="1"/>
+              <p:nvPr/>
+            </p:nvSpPr>
+            <p:spPr>
+              <a:xfrm>
+                <a:off x="1547113" y="1096414"/>
+                <a:ext cx="258992" cy="206136"/>
+              </a:xfrm>
+              <a:prstGeom prst="rect">
+                <a:avLst/>
+              </a:prstGeom>
+              <a:solidFill>
+                <a:schemeClr val="lt1"/>
+              </a:solidFill>
+              <a:ln w="6350">
+                <a:noFill/>
+              </a:ln>
+              <a:effectLst/>
+            </p:spPr>
+            <p:style>
+              <a:lnRef idx="0">
+                <a:schemeClr val="accent1"/>
+              </a:lnRef>
+              <a:fillRef idx="0">
+                <a:schemeClr val="accent1"/>
+              </a:fillRef>
+              <a:effectRef idx="0">
+                <a:schemeClr val="accent1"/>
+              </a:effectRef>
+              <a:fontRef idx="minor">
+                <a:schemeClr val="dk1"/>
+              </a:fontRef>
+            </p:style>
+            <p:txBody>
+              <a:bodyPr rot="0" spcFirstLastPara="0" vert="horz" wrap="square" lIns="91440" tIns="45720" rIns="91440" bIns="45720" numCol="1" spcCol="0" rtlCol="0" fromWordArt="0" anchor="t" anchorCtr="0" forceAA="0" compatLnSpc="1">
+                <a:prstTxWarp prst="textNoShape">
+                  <a:avLst/>
+                </a:prstTxWarp>
+                <a:noAutofit/>
+              </a:bodyPr>
+              <a:lstStyle/>
+              <a:p>
+                <a:pPr marL="0" marR="0" algn="just">
+                  <a:spcBef>
+                    <a:spcPts val="0"/>
+                  </a:spcBef>
+                  <a:spcAft>
+                    <a:spcPts val="0"/>
+                  </a:spcAft>
+                </a:pPr>
+                <a:r>
+                  <a:rPr lang="en-US" sz="800" i="1">
+                    <a:effectLst/>
+                    <a:latin typeface="Times New Roman" panose="02020603050405020304" pitchFamily="18" charset="0"/>
+                    <a:ea typeface="Times New Roman" panose="02020603050405020304" pitchFamily="18" charset="0"/>
+                  </a:rPr>
+                  <a:t>f</a:t>
+                </a:r>
+                <a:endParaRPr lang="en-US" sz="900">
+                  <a:effectLst/>
+                  <a:latin typeface="Times New Roman" panose="02020603050405020304" pitchFamily="18" charset="0"/>
+                  <a:ea typeface="Times New Roman" panose="02020603050405020304" pitchFamily="18" charset="0"/>
+                </a:endParaRPr>
+              </a:p>
+            </p:txBody>
+          </p:sp>
+          <mc:AlternateContent xmlns:mc="http://schemas.openxmlformats.org/markup-compatibility/2006">
+            <mc:Choice xmlns:a14="http://schemas.microsoft.com/office/drawing/2010/main" Requires="a14">
+              <p:sp>
+                <p:nvSpPr>
+                  <p:cNvPr id="20" name="Text Box 338"/>
+                  <p:cNvSpPr txBox="1"/>
+                  <p:nvPr/>
+                </p:nvSpPr>
+                <p:spPr>
+                  <a:xfrm>
+                    <a:off x="0" y="0"/>
+                    <a:ext cx="364703" cy="227278"/>
+                  </a:xfrm>
+                  <a:prstGeom prst="rect">
+                    <a:avLst/>
+                  </a:prstGeom>
+                  <a:solidFill>
+                    <a:schemeClr val="lt1"/>
+                  </a:solidFill>
+                  <a:ln w="6350">
+                    <a:noFill/>
+                  </a:ln>
+                  <a:effectLst/>
+                </p:spPr>
+                <p:style>
+                  <a:lnRef idx="0">
+                    <a:schemeClr val="accent1"/>
+                  </a:lnRef>
+                  <a:fillRef idx="0">
+                    <a:schemeClr val="accent1"/>
+                  </a:fillRef>
+                  <a:effectRef idx="0">
+                    <a:schemeClr val="accent1"/>
+                  </a:effectRef>
+                  <a:fontRef idx="minor">
+                    <a:schemeClr val="dk1"/>
+                  </a:fontRef>
+                </p:style>
+                <p:txBody>
+                  <a:bodyPr rot="0" spcFirstLastPara="0" vert="horz" wrap="square" lIns="91440" tIns="45720" rIns="91440" bIns="45720" numCol="1" spcCol="0" rtlCol="0" fromWordArt="0" anchor="t" anchorCtr="0" forceAA="0" compatLnSpc="1">
+                    <a:prstTxWarp prst="textNoShape">
+                      <a:avLst/>
+                    </a:prstTxWarp>
+                    <a:noAutofit/>
+                  </a:bodyPr>
+                  <a:lstStyle/>
+                  <a:p>
+                    <a:pPr marL="0" marR="0" algn="just">
+                      <a:spcBef>
+                        <a:spcPts val="0"/>
+                      </a:spcBef>
+                      <a:spcAft>
+                        <a:spcPts val="0"/>
+                      </a:spcAft>
+                    </a:pPr>
+                    <a14:m>
+                      <m:oMath xmlns:m="http://schemas.openxmlformats.org/officeDocument/2006/math">
+                        <m:acc>
+                          <m:accPr>
+                            <m:chr m:val="̃"/>
+                            <m:ctrlPr>
+                              <a:rPr lang="en-US" sz="800" i="1">
+                                <a:effectLst/>
+                                <a:latin typeface="Cambria Math" panose="02040503050406030204" pitchFamily="18" charset="0"/>
+                                <a:ea typeface="Calibri" panose="020F0502020204030204" pitchFamily="34" charset="0"/>
+                                <a:cs typeface="Vrinda"/>
+                              </a:rPr>
+                            </m:ctrlPr>
+                          </m:accPr>
+                          <m:e>
+                            <m:r>
+                              <a:rPr lang="en-US" sz="800" i="1">
+                                <a:effectLst/>
+                                <a:latin typeface="Cambria Math" panose="02040503050406030204" pitchFamily="18" charset="0"/>
+                                <a:ea typeface="Times New Roman" panose="02020603050405020304" pitchFamily="18" charset="0"/>
+                              </a:rPr>
+                              <m:t>𝑆</m:t>
+                            </m:r>
+                          </m:e>
+                        </m:acc>
+                      </m:oMath>
+                    </a14:m>
+                    <a:r>
+                      <a:rPr lang="en-US" sz="800">
+                        <a:effectLst/>
+                        <a:latin typeface="Times New Roman" panose="02020603050405020304" pitchFamily="18" charset="0"/>
+                        <a:ea typeface="Times New Roman" panose="02020603050405020304" pitchFamily="18" charset="0"/>
+                      </a:rPr>
+                      <a:t>(k)</a:t>
+                    </a:r>
+                    <a:endParaRPr lang="en-US" sz="900">
+                      <a:effectLst/>
+                      <a:latin typeface="Times New Roman" panose="02020603050405020304" pitchFamily="18" charset="0"/>
+                      <a:ea typeface="Times New Roman" panose="02020603050405020304" pitchFamily="18" charset="0"/>
+                    </a:endParaRPr>
+                  </a:p>
+                </p:txBody>
+              </p:sp>
+            </mc:Choice>
+            <mc:Fallback>
+              <p:sp>
+                <p:nvSpPr>
+                  <p:cNvPr id="20" name="Text Box 338"/>
+                  <p:cNvSpPr txBox="1">
+                    <a:spLocks noRot="1" noChangeAspect="1" noMove="1" noResize="1" noEditPoints="1" noAdjustHandles="1" noChangeArrowheads="1" noChangeShapeType="1" noTextEdit="1"/>
+                  </p:cNvSpPr>
+                  <p:nvPr/>
+                </p:nvSpPr>
+                <p:spPr>
+                  <a:xfrm>
+                    <a:off x="0" y="0"/>
+                    <a:ext cx="364703" cy="227278"/>
+                  </a:xfrm>
+                  <a:prstGeom prst="rect">
+                    <a:avLst/>
+                  </a:prstGeom>
+                  <a:blipFill rotWithShape="0">
+                    <a:blip r:embed="rId4"/>
+                    <a:stretch>
+                      <a:fillRect/>
+                    </a:stretch>
+                  </a:blipFill>
+                  <a:ln w="6350">
+                    <a:noFill/>
+                  </a:ln>
+                  <a:effectLst/>
+                </p:spPr>
+                <p:txBody>
+                  <a:bodyPr/>
+                  <a:lstStyle/>
+                  <a:p>
+                    <a:r>
+                      <a:rPr lang="en-US">
+                        <a:noFill/>
+                      </a:rPr>
+                      <a:t> </a:t>
+                    </a:r>
+                  </a:p>
+                </p:txBody>
+              </p:sp>
+            </mc:Fallback>
+          </mc:AlternateContent>
+          <p:sp>
+            <p:nvSpPr>
+              <p:cNvPr id="21" name="Isosceles Triangle 20"/>
+              <p:cNvSpPr/>
+              <p:nvPr/>
+            </p:nvSpPr>
+            <p:spPr>
+              <a:xfrm>
+                <a:off x="143010" y="611045"/>
+                <a:ext cx="116840" cy="586105"/>
+              </a:xfrm>
+              <a:prstGeom prst="triangle">
+                <a:avLst/>
+              </a:prstGeom>
+              <a:noFill/>
+              <a:ln w="3175">
+                <a:solidFill>
+                  <a:schemeClr val="tx1"/>
+                </a:solidFill>
+              </a:ln>
+            </p:spPr>
+            <p:style>
+              <a:lnRef idx="2">
+                <a:schemeClr val="accent1">
+                  <a:shade val="50000"/>
+                </a:schemeClr>
+              </a:lnRef>
+              <a:fillRef idx="1">
+                <a:schemeClr val="accent1"/>
+              </a:fillRef>
+              <a:effectRef idx="0">
+                <a:schemeClr val="accent1"/>
+              </a:effectRef>
+              <a:fontRef idx="minor">
+                <a:schemeClr val="lt1"/>
+              </a:fontRef>
+            </p:style>
+            <p:txBody>
+              <a:bodyPr rot="0" spcFirstLastPara="0" vert="horz" wrap="square" lIns="91440" tIns="45720" rIns="91440" bIns="45720" numCol="1" spcCol="0" rtlCol="0" fromWordArt="0" anchor="ctr" anchorCtr="0" forceAA="0" compatLnSpc="1">
+                <a:prstTxWarp prst="textNoShape">
+                  <a:avLst/>
+                </a:prstTxWarp>
+                <a:noAutofit/>
+              </a:bodyPr>
+              <a:lstStyle/>
+              <a:p>
+                <a:endParaRPr lang="en-US"/>
+              </a:p>
+            </p:txBody>
+          </p:sp>
+          <p:sp>
+            <p:nvSpPr>
+              <p:cNvPr id="22" name="Isosceles Triangle 21"/>
+              <p:cNvSpPr/>
+              <p:nvPr/>
+            </p:nvSpPr>
+            <p:spPr>
+              <a:xfrm>
+                <a:off x="216682" y="611045"/>
+                <a:ext cx="107950" cy="586105"/>
+              </a:xfrm>
+              <a:prstGeom prst="triangle">
+                <a:avLst/>
+              </a:prstGeom>
+              <a:noFill/>
+              <a:ln w="3175">
+                <a:solidFill>
+                  <a:schemeClr val="tx1"/>
+                </a:solidFill>
+              </a:ln>
+            </p:spPr>
+            <p:style>
+              <a:lnRef idx="2">
+                <a:schemeClr val="accent1">
+                  <a:shade val="50000"/>
+                </a:schemeClr>
+              </a:lnRef>
+              <a:fillRef idx="1">
+                <a:schemeClr val="accent1"/>
+              </a:fillRef>
+              <a:effectRef idx="0">
+                <a:schemeClr val="accent1"/>
+              </a:effectRef>
+              <a:fontRef idx="minor">
+                <a:schemeClr val="lt1"/>
+              </a:fontRef>
+            </p:style>
+            <p:txBody>
+              <a:bodyPr rot="0" spcFirstLastPara="0" vert="horz" wrap="square" lIns="91440" tIns="45720" rIns="91440" bIns="45720" numCol="1" spcCol="0" rtlCol="0" fromWordArt="0" anchor="ctr" anchorCtr="0" forceAA="0" compatLnSpc="1">
+                <a:prstTxWarp prst="textNoShape">
+                  <a:avLst/>
+                </a:prstTxWarp>
+                <a:noAutofit/>
+              </a:bodyPr>
+              <a:lstStyle/>
+              <a:p>
+                <a:endParaRPr lang="en-US"/>
+              </a:p>
+            </p:txBody>
+          </p:sp>
+          <p:sp>
+            <p:nvSpPr>
+              <p:cNvPr id="23" name="Isosceles Triangle 22"/>
+              <p:cNvSpPr/>
+              <p:nvPr/>
+            </p:nvSpPr>
+            <p:spPr>
+              <a:xfrm>
+                <a:off x="299022" y="611045"/>
+                <a:ext cx="116840" cy="586105"/>
+              </a:xfrm>
+              <a:prstGeom prst="triangle">
+                <a:avLst/>
+              </a:prstGeom>
+              <a:noFill/>
+              <a:ln w="3175">
+                <a:solidFill>
+                  <a:schemeClr val="tx1"/>
+                </a:solidFill>
+              </a:ln>
+            </p:spPr>
+            <p:style>
+              <a:lnRef idx="2">
+                <a:schemeClr val="accent1">
+                  <a:shade val="50000"/>
+                </a:schemeClr>
+              </a:lnRef>
+              <a:fillRef idx="1">
+                <a:schemeClr val="accent1"/>
+              </a:fillRef>
+              <a:effectRef idx="0">
+                <a:schemeClr val="accent1"/>
+              </a:effectRef>
+              <a:fontRef idx="minor">
+                <a:schemeClr val="lt1"/>
+              </a:fontRef>
+            </p:style>
+            <p:txBody>
+              <a:bodyPr rot="0" spcFirstLastPara="0" vert="horz" wrap="square" lIns="91440" tIns="45720" rIns="91440" bIns="45720" numCol="1" spcCol="0" rtlCol="0" fromWordArt="0" anchor="ctr" anchorCtr="0" forceAA="0" compatLnSpc="1">
+                <a:prstTxWarp prst="textNoShape">
+                  <a:avLst/>
+                </a:prstTxWarp>
+                <a:noAutofit/>
+              </a:bodyPr>
+              <a:lstStyle/>
+              <a:p>
+                <a:endParaRPr lang="en-US"/>
+              </a:p>
+            </p:txBody>
+          </p:sp>
+          <p:sp>
+            <p:nvSpPr>
+              <p:cNvPr id="24" name="Isosceles Triangle 23"/>
+              <p:cNvSpPr/>
+              <p:nvPr/>
+            </p:nvSpPr>
+            <p:spPr>
+              <a:xfrm>
+                <a:off x="368360" y="611045"/>
+                <a:ext cx="147955" cy="586105"/>
+              </a:xfrm>
+              <a:prstGeom prst="triangle">
+                <a:avLst/>
+              </a:prstGeom>
+              <a:noFill/>
+              <a:ln w="3175">
+                <a:solidFill>
+                  <a:schemeClr val="tx1"/>
+                </a:solidFill>
+              </a:ln>
+            </p:spPr>
+            <p:style>
+              <a:lnRef idx="2">
+                <a:schemeClr val="accent1">
+                  <a:shade val="50000"/>
+                </a:schemeClr>
+              </a:lnRef>
+              <a:fillRef idx="1">
+                <a:schemeClr val="accent1"/>
+              </a:fillRef>
+              <a:effectRef idx="0">
+                <a:schemeClr val="accent1"/>
+              </a:effectRef>
+              <a:fontRef idx="minor">
+                <a:schemeClr val="lt1"/>
+              </a:fontRef>
+            </p:style>
+            <p:txBody>
+              <a:bodyPr rot="0" spcFirstLastPara="0" vert="horz" wrap="square" lIns="91440" tIns="45720" rIns="91440" bIns="45720" numCol="1" spcCol="0" rtlCol="0" fromWordArt="0" anchor="ctr" anchorCtr="0" forceAA="0" compatLnSpc="1">
+                <a:prstTxWarp prst="textNoShape">
+                  <a:avLst/>
+                </a:prstTxWarp>
+                <a:noAutofit/>
+              </a:bodyPr>
+              <a:lstStyle/>
+              <a:p>
+                <a:endParaRPr lang="en-US"/>
+              </a:p>
+            </p:txBody>
+          </p:sp>
+          <p:sp>
+            <p:nvSpPr>
+              <p:cNvPr id="25" name="Isosceles Triangle 24"/>
+              <p:cNvSpPr/>
+              <p:nvPr/>
+            </p:nvSpPr>
+            <p:spPr>
+              <a:xfrm>
+                <a:off x="442032" y="615379"/>
+                <a:ext cx="216535" cy="586105"/>
+              </a:xfrm>
+              <a:prstGeom prst="triangle">
+                <a:avLst/>
+              </a:prstGeom>
+              <a:noFill/>
+              <a:ln w="3175">
+                <a:solidFill>
+                  <a:schemeClr val="tx1"/>
+                </a:solidFill>
+              </a:ln>
+            </p:spPr>
+            <p:style>
+              <a:lnRef idx="2">
+                <a:schemeClr val="accent1">
+                  <a:shade val="50000"/>
+                </a:schemeClr>
+              </a:lnRef>
+              <a:fillRef idx="1">
+                <a:schemeClr val="accent1"/>
+              </a:fillRef>
+              <a:effectRef idx="0">
+                <a:schemeClr val="accent1"/>
+              </a:effectRef>
+              <a:fontRef idx="minor">
+                <a:schemeClr val="lt1"/>
+              </a:fontRef>
+            </p:style>
+            <p:txBody>
+              <a:bodyPr rot="0" spcFirstLastPara="0" vert="horz" wrap="square" lIns="91440" tIns="45720" rIns="91440" bIns="45720" numCol="1" spcCol="0" rtlCol="0" fromWordArt="0" anchor="ctr" anchorCtr="0" forceAA="0" compatLnSpc="1">
+                <a:prstTxWarp prst="textNoShape">
+                  <a:avLst/>
+                </a:prstTxWarp>
+                <a:noAutofit/>
+              </a:bodyPr>
+              <a:lstStyle/>
+              <a:p>
+                <a:endParaRPr lang="en-US"/>
+              </a:p>
+            </p:txBody>
+          </p:sp>
+          <p:sp>
+            <p:nvSpPr>
+              <p:cNvPr id="26" name="Isosceles Triangle 25"/>
+              <p:cNvSpPr/>
+              <p:nvPr/>
+            </p:nvSpPr>
+            <p:spPr>
+              <a:xfrm>
+                <a:off x="546040" y="615379"/>
+                <a:ext cx="233680" cy="586105"/>
+              </a:xfrm>
+              <a:prstGeom prst="triangle">
+                <a:avLst/>
+              </a:prstGeom>
+              <a:noFill/>
+              <a:ln w="3175">
+                <a:solidFill>
+                  <a:schemeClr val="tx1"/>
+                </a:solidFill>
+              </a:ln>
+            </p:spPr>
+            <p:style>
+              <a:lnRef idx="2">
+                <a:schemeClr val="accent1">
+                  <a:shade val="50000"/>
+                </a:schemeClr>
+              </a:lnRef>
+              <a:fillRef idx="1">
+                <a:schemeClr val="accent1"/>
+              </a:fillRef>
+              <a:effectRef idx="0">
+                <a:schemeClr val="accent1"/>
+              </a:effectRef>
+              <a:fontRef idx="minor">
+                <a:schemeClr val="lt1"/>
+              </a:fontRef>
+            </p:style>
+            <p:txBody>
+              <a:bodyPr rot="0" spcFirstLastPara="0" vert="horz" wrap="square" lIns="91440" tIns="45720" rIns="91440" bIns="45720" numCol="1" spcCol="0" rtlCol="0" fromWordArt="0" anchor="ctr" anchorCtr="0" forceAA="0" compatLnSpc="1">
+                <a:prstTxWarp prst="textNoShape">
+                  <a:avLst/>
+                </a:prstTxWarp>
+                <a:noAutofit/>
+              </a:bodyPr>
+              <a:lstStyle/>
+              <a:p>
+                <a:endParaRPr lang="en-US"/>
+              </a:p>
+            </p:txBody>
+          </p:sp>
+          <p:sp>
+            <p:nvSpPr>
+              <p:cNvPr id="27" name="Isosceles Triangle 26"/>
+              <p:cNvSpPr/>
+              <p:nvPr/>
+            </p:nvSpPr>
+            <p:spPr>
+              <a:xfrm>
+                <a:off x="719386" y="615379"/>
+                <a:ext cx="233680" cy="586105"/>
+              </a:xfrm>
+              <a:prstGeom prst="triangle">
+                <a:avLst/>
+              </a:prstGeom>
+              <a:noFill/>
+              <a:ln w="3175">
+                <a:solidFill>
+                  <a:schemeClr val="tx1"/>
+                </a:solidFill>
+              </a:ln>
+            </p:spPr>
+            <p:style>
+              <a:lnRef idx="2">
+                <a:schemeClr val="accent1">
+                  <a:shade val="50000"/>
+                </a:schemeClr>
+              </a:lnRef>
+              <a:fillRef idx="1">
+                <a:schemeClr val="accent1"/>
+              </a:fillRef>
+              <a:effectRef idx="0">
+                <a:schemeClr val="accent1"/>
+              </a:effectRef>
+              <a:fontRef idx="minor">
+                <a:schemeClr val="lt1"/>
+              </a:fontRef>
+            </p:style>
+            <p:txBody>
+              <a:bodyPr rot="0" spcFirstLastPara="0" vert="horz" wrap="square" lIns="91440" tIns="45720" rIns="91440" bIns="45720" numCol="1" spcCol="0" rtlCol="0" fromWordArt="0" anchor="ctr" anchorCtr="0" forceAA="0" compatLnSpc="1">
+                <a:prstTxWarp prst="textNoShape">
+                  <a:avLst/>
+                </a:prstTxWarp>
+                <a:noAutofit/>
+              </a:bodyPr>
+              <a:lstStyle/>
+              <a:p>
+                <a:endParaRPr lang="en-US"/>
+              </a:p>
+            </p:txBody>
+          </p:sp>
+          <p:sp>
+            <p:nvSpPr>
+              <p:cNvPr id="28" name="Isosceles Triangle 27"/>
+              <p:cNvSpPr/>
+              <p:nvPr/>
+            </p:nvSpPr>
+            <p:spPr>
+              <a:xfrm>
+                <a:off x="866730" y="615379"/>
+                <a:ext cx="325023" cy="586105"/>
+              </a:xfrm>
+              <a:prstGeom prst="triangle">
+                <a:avLst/>
+              </a:prstGeom>
+              <a:noFill/>
+              <a:ln w="3175">
+                <a:solidFill>
+                  <a:schemeClr val="tx1"/>
+                </a:solidFill>
+              </a:ln>
+            </p:spPr>
+            <p:style>
+              <a:lnRef idx="2">
+                <a:schemeClr val="accent1">
+                  <a:shade val="50000"/>
+                </a:schemeClr>
+              </a:lnRef>
+              <a:fillRef idx="1">
+                <a:schemeClr val="accent1"/>
+              </a:fillRef>
+              <a:effectRef idx="0">
+                <a:schemeClr val="accent1"/>
+              </a:effectRef>
+              <a:fontRef idx="minor">
+                <a:schemeClr val="lt1"/>
+              </a:fontRef>
+            </p:style>
+            <p:txBody>
+              <a:bodyPr rot="0" spcFirstLastPara="0" vert="horz" wrap="square" lIns="91440" tIns="45720" rIns="91440" bIns="45720" numCol="1" spcCol="0" rtlCol="0" fromWordArt="0" anchor="ctr" anchorCtr="0" forceAA="0" compatLnSpc="1">
+                <a:prstTxWarp prst="textNoShape">
+                  <a:avLst/>
+                </a:prstTxWarp>
+                <a:noAutofit/>
+              </a:bodyPr>
+              <a:lstStyle/>
+              <a:p>
+                <a:endParaRPr lang="en-US"/>
+              </a:p>
+            </p:txBody>
+          </p:sp>
+          <p:sp>
+            <p:nvSpPr>
+              <p:cNvPr id="29" name="Isosceles Triangle 28"/>
+              <p:cNvSpPr/>
+              <p:nvPr/>
+            </p:nvSpPr>
+            <p:spPr>
+              <a:xfrm>
+                <a:off x="1070411" y="615379"/>
+                <a:ext cx="382526" cy="586105"/>
+              </a:xfrm>
+              <a:prstGeom prst="triangle">
+                <a:avLst/>
+              </a:prstGeom>
+              <a:noFill/>
+              <a:ln w="3175">
+                <a:solidFill>
+                  <a:schemeClr val="tx1"/>
+                </a:solidFill>
+              </a:ln>
+            </p:spPr>
+            <p:style>
+              <a:lnRef idx="2">
+                <a:schemeClr val="accent1">
+                  <a:shade val="50000"/>
+                </a:schemeClr>
+              </a:lnRef>
+              <a:fillRef idx="1">
+                <a:schemeClr val="accent1"/>
+              </a:fillRef>
+              <a:effectRef idx="0">
+                <a:schemeClr val="accent1"/>
+              </a:effectRef>
+              <a:fontRef idx="minor">
+                <a:schemeClr val="lt1"/>
+              </a:fontRef>
+            </p:style>
+            <p:txBody>
+              <a:bodyPr rot="0" spcFirstLastPara="0" vert="horz" wrap="square" lIns="91440" tIns="45720" rIns="91440" bIns="45720" numCol="1" spcCol="0" rtlCol="0" fromWordArt="0" anchor="ctr" anchorCtr="0" forceAA="0" compatLnSpc="1">
+                <a:prstTxWarp prst="textNoShape">
+                  <a:avLst/>
+                </a:prstTxWarp>
+                <a:noAutofit/>
+              </a:bodyPr>
+              <a:lstStyle/>
+              <a:p>
+                <a:endParaRPr lang="en-US"/>
+              </a:p>
+            </p:txBody>
+          </p:sp>
+        </p:grpSp>
+      </p:grpSp>
     </p:spTree>
     <p:extLst>
       <p:ext uri="{BB962C8B-B14F-4D97-AF65-F5344CB8AC3E}">
@@ -4617,7 +5496,7 @@
           <p:cNvPr id="6" name="Picture 5">
             <a:extLst>
               <a:ext uri="{FF2B5EF4-FFF2-40B4-BE49-F238E27FC236}">
-                <a16:creationId xmlns:a16="http://schemas.microsoft.com/office/drawing/2014/main" id="{26833A9F-A38E-49FF-AC32-3627AFE5F12F}"/>
+                <a16:creationId xmlns:a16="http://schemas.microsoft.com/office/drawing/2014/main" xmlns="" id="{26833A9F-A38E-49FF-AC32-3627AFE5F12F}"/>
               </a:ext>
             </a:extLst>
           </p:cNvPr>
@@ -4784,7 +5663,7 @@
           <p:cNvPr id="6" name="Picture 5">
             <a:extLst>
               <a:ext uri="{FF2B5EF4-FFF2-40B4-BE49-F238E27FC236}">
-                <a16:creationId xmlns:a16="http://schemas.microsoft.com/office/drawing/2014/main" id="{9E0459C3-50C4-4F3C-B488-309B412F3D1C}"/>
+                <a16:creationId xmlns:a16="http://schemas.microsoft.com/office/drawing/2014/main" xmlns="" id="{9E0459C3-50C4-4F3C-B488-309B412F3D1C}"/>
               </a:ext>
             </a:extLst>
           </p:cNvPr>
@@ -4814,7 +5693,7 @@
           <p:cNvPr id="7" name="Picture 6">
             <a:extLst>
               <a:ext uri="{FF2B5EF4-FFF2-40B4-BE49-F238E27FC236}">
-                <a16:creationId xmlns:a16="http://schemas.microsoft.com/office/drawing/2014/main" id="{5B0F4C63-0A4B-4EAA-9967-E75E6A2FFDC2}"/>
+                <a16:creationId xmlns:a16="http://schemas.microsoft.com/office/drawing/2014/main" xmlns="" id="{5B0F4C63-0A4B-4EAA-9967-E75E6A2FFDC2}"/>
               </a:ext>
             </a:extLst>
           </p:cNvPr>
@@ -4984,7 +5863,7 @@
           <p:cNvPr id="8" name="Picture 7" descr="C:\Users\David\Pictures\knn_bw.png">
             <a:extLst>
               <a:ext uri="{FF2B5EF4-FFF2-40B4-BE49-F238E27FC236}">
-                <a16:creationId xmlns:a16="http://schemas.microsoft.com/office/drawing/2014/main" id="{D7C26172-1B9D-44B9-89C2-7497218965D2}"/>
+                <a16:creationId xmlns:a16="http://schemas.microsoft.com/office/drawing/2014/main" xmlns="" id="{D7C26172-1B9D-44B9-89C2-7497218965D2}"/>
               </a:ext>
             </a:extLst>
           </p:cNvPr>
@@ -5111,19 +5990,18 @@
               <a:buChar char="•"/>
             </a:pPr>
             <a:r>
+              <a:rPr lang="en-US" b="0" dirty="0" smtClean="0"/>
+              <a:t>Difficult </a:t>
+            </a:r>
+            <a:r>
               <a:rPr lang="en-US" b="0" dirty="0"/>
-              <a:t>Strong read-read and phone-phone results</a:t>
-            </a:r>
-          </a:p>
-          <a:p>
-            <a:pPr marL="342900" indent="-342900">
-              <a:buFont typeface="Arial" panose="020B0604020202020204" pitchFamily="34" charset="0"/>
-              <a:buChar char="•"/>
-            </a:pPr>
-            <a:r>
-              <a:rPr lang="en-US" b="0" dirty="0"/>
-              <a:t>Difficult to provide a robust model of mismatch case</a:t>
-            </a:r>
+              <a:t>to provide a robust model </a:t>
+            </a:r>
+            <a:r>
+              <a:rPr lang="en-US" b="0" dirty="0" smtClean="0"/>
+              <a:t>for both text-independent and text-dependent cases</a:t>
+            </a:r>
+            <a:endParaRPr lang="en-US" b="0" dirty="0"/>
           </a:p>
         </p:txBody>
       </p:sp>
@@ -5163,7 +6041,7 @@
           <p:cNvPr id="9" name="Picture 8">
             <a:extLst>
               <a:ext uri="{FF2B5EF4-FFF2-40B4-BE49-F238E27FC236}">
-                <a16:creationId xmlns:a16="http://schemas.microsoft.com/office/drawing/2014/main" id="{6D9DB127-9AF9-47C1-9C88-43EE588E482B}"/>
+                <a16:creationId xmlns:a16="http://schemas.microsoft.com/office/drawing/2014/main" xmlns="" id="{6D9DB127-9AF9-47C1-9C88-43EE588E482B}"/>
               </a:ext>
             </a:extLst>
           </p:cNvPr>
@@ -5180,14 +6058,177 @@
         </p:blipFill>
         <p:spPr>
           <a:xfrm>
-            <a:off x="1509712" y="2895600"/>
-            <a:ext cx="6124575" cy="1304925"/>
+            <a:off x="4642192" y="3059039"/>
+            <a:ext cx="3575088" cy="761722"/>
           </a:xfrm>
           <a:prstGeom prst="rect">
             <a:avLst/>
           </a:prstGeom>
         </p:spPr>
       </p:pic>
+      <p:pic>
+        <p:nvPicPr>
+          <p:cNvPr id="7" name="Picture 6"/>
+          <p:cNvPicPr>
+            <a:picLocks noChangeAspect="1"/>
+          </p:cNvPicPr>
+          <p:nvPr/>
+        </p:nvPicPr>
+        <p:blipFill>
+          <a:blip r:embed="rId3"/>
+          <a:stretch>
+            <a:fillRect/>
+          </a:stretch>
+        </p:blipFill>
+        <p:spPr>
+          <a:xfrm>
+            <a:off x="471869" y="3048000"/>
+            <a:ext cx="3893528" cy="772761"/>
+          </a:xfrm>
+          <a:prstGeom prst="rect">
+            <a:avLst/>
+          </a:prstGeom>
+        </p:spPr>
+      </p:pic>
+      <p:pic>
+        <p:nvPicPr>
+          <p:cNvPr id="8" name="Picture 7"/>
+          <p:cNvPicPr>
+            <a:picLocks noChangeAspect="1"/>
+          </p:cNvPicPr>
+          <p:nvPr/>
+        </p:nvPicPr>
+        <p:blipFill>
+          <a:blip r:embed="rId4"/>
+          <a:stretch>
+            <a:fillRect/>
+          </a:stretch>
+        </p:blipFill>
+        <p:spPr>
+          <a:xfrm>
+            <a:off x="465909" y="5060275"/>
+            <a:ext cx="3922867" cy="761722"/>
+          </a:xfrm>
+          <a:prstGeom prst="rect">
+            <a:avLst/>
+          </a:prstGeom>
+        </p:spPr>
+      </p:pic>
+      <p:pic>
+        <p:nvPicPr>
+          <p:cNvPr id="11" name="Picture 10"/>
+          <p:cNvPicPr>
+            <a:picLocks noChangeAspect="1"/>
+          </p:cNvPicPr>
+          <p:nvPr/>
+        </p:nvPicPr>
+        <p:blipFill>
+          <a:blip r:embed="rId5"/>
+          <a:stretch>
+            <a:fillRect/>
+          </a:stretch>
+        </p:blipFill>
+        <p:spPr>
+          <a:xfrm>
+            <a:off x="4642192" y="5078052"/>
+            <a:ext cx="3747550" cy="702666"/>
+          </a:xfrm>
+          <a:prstGeom prst="rect">
+            <a:avLst/>
+          </a:prstGeom>
+        </p:spPr>
+      </p:pic>
+      <p:cxnSp>
+        <p:nvCxnSpPr>
+          <p:cNvPr id="13" name="Straight Connector 12"/>
+          <p:cNvCxnSpPr/>
+          <p:nvPr/>
+        </p:nvCxnSpPr>
+        <p:spPr>
+          <a:xfrm>
+            <a:off x="609600" y="4191000"/>
+            <a:ext cx="7620000" cy="0"/>
+          </a:xfrm>
+          <a:prstGeom prst="line">
+            <a:avLst/>
+          </a:prstGeom>
+          <a:ln w="28575"/>
+        </p:spPr>
+        <p:style>
+          <a:lnRef idx="1">
+            <a:schemeClr val="dk1"/>
+          </a:lnRef>
+          <a:fillRef idx="0">
+            <a:schemeClr val="dk1"/>
+          </a:fillRef>
+          <a:effectRef idx="0">
+            <a:schemeClr val="dk1"/>
+          </a:effectRef>
+          <a:fontRef idx="minor">
+            <a:schemeClr val="tx1"/>
+          </a:fontRef>
+        </p:style>
+      </p:cxnSp>
+      <p:sp>
+        <p:nvSpPr>
+          <p:cNvPr id="14" name="TextBox 13"/>
+          <p:cNvSpPr txBox="1"/>
+          <p:nvPr/>
+        </p:nvSpPr>
+        <p:spPr>
+          <a:xfrm>
+            <a:off x="3733800" y="2586992"/>
+            <a:ext cx="1600200" cy="381000"/>
+          </a:xfrm>
+          <a:prstGeom prst="rect">
+            <a:avLst/>
+          </a:prstGeom>
+          <a:noFill/>
+        </p:spPr>
+        <p:txBody>
+          <a:bodyPr wrap="square" rtlCol="0">
+            <a:spAutoFit/>
+          </a:bodyPr>
+          <a:lstStyle/>
+          <a:p>
+            <a:r>
+              <a:rPr lang="en-US" i="1" u="sng" dirty="0" smtClean="0"/>
+              <a:t>Old Data</a:t>
+            </a:r>
+            <a:endParaRPr lang="en-US" i="1" u="sng" dirty="0"/>
+          </a:p>
+        </p:txBody>
+      </p:sp>
+      <p:sp>
+        <p:nvSpPr>
+          <p:cNvPr id="15" name="TextBox 14"/>
+          <p:cNvSpPr txBox="1"/>
+          <p:nvPr/>
+        </p:nvSpPr>
+        <p:spPr>
+          <a:xfrm>
+            <a:off x="3842092" y="4499535"/>
+            <a:ext cx="1600200" cy="381000"/>
+          </a:xfrm>
+          <a:prstGeom prst="rect">
+            <a:avLst/>
+          </a:prstGeom>
+          <a:noFill/>
+        </p:spPr>
+        <p:txBody>
+          <a:bodyPr wrap="square" rtlCol="0">
+            <a:spAutoFit/>
+          </a:bodyPr>
+          <a:lstStyle/>
+          <a:p>
+            <a:r>
+              <a:rPr lang="en-US" i="1" u="sng" dirty="0" smtClean="0"/>
+              <a:t>New Data</a:t>
+            </a:r>
+            <a:endParaRPr lang="en-US" i="1" u="sng" dirty="0"/>
+          </a:p>
+        </p:txBody>
+      </p:sp>
     </p:spTree>
     <p:extLst>
       <p:ext uri="{BB962C8B-B14F-4D97-AF65-F5344CB8AC3E}">

</xml_diff>

<commit_message>
Updated following pow wow
</commit_message>
<xml_diff>
--- a/Report/M214A Project Presentation.pptx
+++ b/Report/M214A Project Presentation.pptx
@@ -7,15 +7,14 @@
   <p:sldIdLst>
     <p:sldId id="256" r:id="rId2"/>
     <p:sldId id="257" r:id="rId3"/>
-    <p:sldId id="266" r:id="rId4"/>
-    <p:sldId id="261" r:id="rId5"/>
-    <p:sldId id="262" r:id="rId6"/>
-    <p:sldId id="263" r:id="rId7"/>
-    <p:sldId id="264" r:id="rId8"/>
-    <p:sldId id="265" r:id="rId9"/>
-    <p:sldId id="267" r:id="rId10"/>
-    <p:sldId id="268" r:id="rId11"/>
-    <p:sldId id="269" r:id="rId12"/>
+    <p:sldId id="261" r:id="rId4"/>
+    <p:sldId id="262" r:id="rId5"/>
+    <p:sldId id="263" r:id="rId6"/>
+    <p:sldId id="264" r:id="rId7"/>
+    <p:sldId id="265" r:id="rId8"/>
+    <p:sldId id="267" r:id="rId9"/>
+    <p:sldId id="268" r:id="rId10"/>
+    <p:sldId id="269" r:id="rId11"/>
   </p:sldIdLst>
   <p:sldSz cx="9144000" cy="6858000" type="screen4x3"/>
   <p:notesSz cx="6858000" cy="9144000"/>
@@ -3593,133 +3592,6 @@
           <a:lstStyle/>
           <a:p>
             <a:r>
-              <a:rPr lang="en-US" sz="2800" b="1" cap="small" dirty="0">
-                <a:solidFill>
-                  <a:schemeClr val="tx1"/>
-                </a:solidFill>
-              </a:rPr>
-              <a:t>Neural Network</a:t>
-            </a:r>
-            <a:endParaRPr lang="en-US" sz="2000" b="1" cap="small" dirty="0">
-              <a:solidFill>
-                <a:schemeClr val="tx1"/>
-              </a:solidFill>
-            </a:endParaRPr>
-          </a:p>
-        </p:txBody>
-      </p:sp>
-      <p:sp>
-        <p:nvSpPr>
-          <p:cNvPr id="3" name="Content Placeholder 2"/>
-          <p:cNvSpPr>
-            <a:spLocks noGrp="1"/>
-          </p:cNvSpPr>
-          <p:nvPr>
-            <p:ph idx="1"/>
-          </p:nvPr>
-        </p:nvSpPr>
-        <p:spPr>
-          <a:xfrm>
-            <a:off x="457200" y="1531618"/>
-            <a:ext cx="7620000" cy="5135563"/>
-          </a:xfrm>
-        </p:spPr>
-        <p:txBody>
-          <a:bodyPr/>
-          <a:lstStyle/>
-          <a:p>
-            <a:pPr marL="342900" indent="-342900">
-              <a:buFont typeface="Arial" panose="020B0604020202020204" pitchFamily="34" charset="0"/>
-              <a:buChar char="•"/>
-            </a:pPr>
-            <a:endParaRPr lang="en-US" b="0" dirty="0"/>
-          </a:p>
-        </p:txBody>
-      </p:sp>
-      <p:cxnSp>
-        <p:nvCxnSpPr>
-          <p:cNvPr id="4" name="Straight Connector 3"/>
-          <p:cNvCxnSpPr/>
-          <p:nvPr/>
-        </p:nvCxnSpPr>
-        <p:spPr>
-          <a:xfrm>
-            <a:off x="0" y="1371600"/>
-            <a:ext cx="7848600" cy="0"/>
-          </a:xfrm>
-          <a:prstGeom prst="line">
-            <a:avLst/>
-          </a:prstGeom>
-          <a:ln w="57150"/>
-        </p:spPr>
-        <p:style>
-          <a:lnRef idx="1">
-            <a:schemeClr val="dk1"/>
-          </a:lnRef>
-          <a:fillRef idx="0">
-            <a:schemeClr val="dk1"/>
-          </a:fillRef>
-          <a:effectRef idx="0">
-            <a:schemeClr val="dk1"/>
-          </a:effectRef>
-          <a:fontRef idx="minor">
-            <a:schemeClr val="tx1"/>
-          </a:fontRef>
-        </p:style>
-      </p:cxnSp>
-    </p:spTree>
-    <p:extLst>
-      <p:ext uri="{BB962C8B-B14F-4D97-AF65-F5344CB8AC3E}">
-        <p14:creationId xmlns:p14="http://schemas.microsoft.com/office/powerpoint/2010/main" val="2045246655"/>
-      </p:ext>
-    </p:extLst>
-  </p:cSld>
-  <p:clrMapOvr>
-    <a:masterClrMapping/>
-  </p:clrMapOvr>
-</p:sld>
-</file>
-
-<file path=ppt/slides/slide11.xml><?xml version="1.0" encoding="utf-8"?>
-<p:sld xmlns:a="http://schemas.openxmlformats.org/drawingml/2006/main" xmlns:r="http://schemas.openxmlformats.org/officeDocument/2006/relationships" xmlns:p="http://schemas.openxmlformats.org/presentationml/2006/main">
-  <p:cSld>
-    <p:spTree>
-      <p:nvGrpSpPr>
-        <p:cNvPr id="1" name=""/>
-        <p:cNvGrpSpPr/>
-        <p:nvPr/>
-      </p:nvGrpSpPr>
-      <p:grpSpPr>
-        <a:xfrm>
-          <a:off x="0" y="0"/>
-          <a:ext cx="0" cy="0"/>
-          <a:chOff x="0" y="0"/>
-          <a:chExt cx="0" cy="0"/>
-        </a:xfrm>
-      </p:grpSpPr>
-      <p:sp>
-        <p:nvSpPr>
-          <p:cNvPr id="2" name="Title 1"/>
-          <p:cNvSpPr>
-            <a:spLocks noGrp="1"/>
-          </p:cNvSpPr>
-          <p:nvPr>
-            <p:ph type="title"/>
-          </p:nvPr>
-        </p:nvSpPr>
-        <p:spPr>
-          <a:xfrm>
-            <a:off x="457200" y="455595"/>
-            <a:ext cx="7162800" cy="685482"/>
-          </a:xfrm>
-        </p:spPr>
-        <p:txBody>
-          <a:bodyPr anchor="t">
-            <a:normAutofit/>
-          </a:bodyPr>
-          <a:lstStyle/>
-          <a:p>
-            <a:r>
               <a:rPr lang="en-US" sz="2800" b="1" cap="small" dirty="0" smtClean="0">
                 <a:solidFill>
                   <a:schemeClr val="tx1"/>
@@ -3859,18 +3731,12 @@
               <a:buChar char="•"/>
             </a:pPr>
             <a:r>
+              <a:rPr lang="en-US" sz="2400" b="0" dirty="0" smtClean="0"/>
+              <a:t>Block </a:t>
+            </a:r>
+            <a:r>
               <a:rPr lang="en-US" sz="2400" b="0" dirty="0"/>
-              <a:t>Goals and Challenges</a:t>
-            </a:r>
-          </a:p>
-          <a:p>
-            <a:pPr marL="342900" indent="-342900">
-              <a:buFont typeface="Arial" panose="020B0604020202020204" pitchFamily="34" charset="0"/>
-              <a:buChar char="•"/>
-            </a:pPr>
-            <a:r>
-              <a:rPr lang="en-US" sz="2400" b="0" dirty="0"/>
-              <a:t>Block Diagram</a:t>
+              <a:t>Diagram</a:t>
             </a:r>
           </a:p>
           <a:p>
@@ -4000,197 +3866,6 @@
         <p:spPr>
           <a:xfrm>
             <a:off x="457200" y="455595"/>
-            <a:ext cx="5791200" cy="685482"/>
-          </a:xfrm>
-        </p:spPr>
-        <p:txBody>
-          <a:bodyPr anchor="t">
-            <a:normAutofit/>
-          </a:bodyPr>
-          <a:lstStyle/>
-          <a:p>
-            <a:r>
-              <a:rPr lang="en-US" sz="2800" b="1" cap="small" dirty="0">
-                <a:solidFill>
-                  <a:schemeClr val="tx1"/>
-                </a:solidFill>
-              </a:rPr>
-              <a:t>Goals and Challenges</a:t>
-            </a:r>
-            <a:endParaRPr lang="en-US" sz="2000" b="1" cap="small" dirty="0">
-              <a:solidFill>
-                <a:schemeClr val="tx1"/>
-              </a:solidFill>
-            </a:endParaRPr>
-          </a:p>
-        </p:txBody>
-      </p:sp>
-      <p:sp>
-        <p:nvSpPr>
-          <p:cNvPr id="3" name="Content Placeholder 2"/>
-          <p:cNvSpPr>
-            <a:spLocks noGrp="1"/>
-          </p:cNvSpPr>
-          <p:nvPr>
-            <p:ph idx="1"/>
-          </p:nvPr>
-        </p:nvSpPr>
-        <p:spPr>
-          <a:xfrm>
-            <a:off x="457200" y="1531618"/>
-            <a:ext cx="7620000" cy="5135563"/>
-          </a:xfrm>
-        </p:spPr>
-        <p:txBody>
-          <a:bodyPr/>
-          <a:lstStyle/>
-          <a:p>
-            <a:pPr marL="342900" indent="-342900">
-              <a:buFont typeface="Arial" panose="020B0604020202020204" pitchFamily="34" charset="0"/>
-              <a:buChar char="•"/>
-            </a:pPr>
-            <a:r>
-              <a:rPr lang="en-US" b="0" dirty="0"/>
-              <a:t>Goal: Develop an accurate speaker verification system to determine if one speaker is the same as another</a:t>
-            </a:r>
-          </a:p>
-          <a:p>
-            <a:pPr marL="800100" lvl="1" indent="-342900">
-              <a:buClrTx/>
-            </a:pPr>
-            <a:r>
-              <a:rPr lang="en-US" dirty="0"/>
-              <a:t>Use Digital Speech Processing and machine learning techniques</a:t>
-            </a:r>
-            <a:endParaRPr lang="en-US" b="0" dirty="0"/>
-          </a:p>
-          <a:p>
-            <a:pPr marL="342900" indent="-342900">
-              <a:buFont typeface="Arial" panose="020B0604020202020204" pitchFamily="34" charset="0"/>
-              <a:buChar char="•"/>
-            </a:pPr>
-            <a:endParaRPr lang="en-US" b="0" dirty="0"/>
-          </a:p>
-          <a:p>
-            <a:pPr marL="342900" indent="-342900">
-              <a:buFont typeface="Arial" panose="020B0604020202020204" pitchFamily="34" charset="0"/>
-              <a:buChar char="•"/>
-            </a:pPr>
-            <a:r>
-              <a:rPr lang="en-US" b="0" dirty="0"/>
-              <a:t>Challenges:</a:t>
-            </a:r>
-          </a:p>
-          <a:p>
-            <a:pPr marL="800100" lvl="1" indent="-342900">
-              <a:buClrTx/>
-            </a:pPr>
-            <a:r>
-              <a:rPr lang="en-US" b="0" dirty="0"/>
-              <a:t>3-5 second samples</a:t>
-            </a:r>
-          </a:p>
-          <a:p>
-            <a:pPr marL="800100" lvl="1" indent="-342900">
-              <a:buClrTx/>
-            </a:pPr>
-            <a:r>
-              <a:rPr lang="en-US" dirty="0"/>
-              <a:t>Text-independent and text-dependent cases</a:t>
-            </a:r>
-          </a:p>
-          <a:p>
-            <a:pPr marL="800100" lvl="1" indent="-342900">
-              <a:buClrTx/>
-            </a:pPr>
-            <a:r>
-              <a:rPr lang="en-US" b="0" dirty="0"/>
-              <a:t>Open data set</a:t>
-            </a:r>
-          </a:p>
-          <a:p>
-            <a:pPr marL="342900" indent="-342900">
-              <a:buFont typeface="Arial" panose="020B0604020202020204" pitchFamily="34" charset="0"/>
-              <a:buChar char="•"/>
-            </a:pPr>
-            <a:endParaRPr lang="en-US" b="0" dirty="0"/>
-          </a:p>
-        </p:txBody>
-      </p:sp>
-      <p:cxnSp>
-        <p:nvCxnSpPr>
-          <p:cNvPr id="4" name="Straight Connector 3"/>
-          <p:cNvCxnSpPr/>
-          <p:nvPr/>
-        </p:nvCxnSpPr>
-        <p:spPr>
-          <a:xfrm>
-            <a:off x="0" y="1371600"/>
-            <a:ext cx="7848600" cy="0"/>
-          </a:xfrm>
-          <a:prstGeom prst="line">
-            <a:avLst/>
-          </a:prstGeom>
-          <a:ln w="57150"/>
-        </p:spPr>
-        <p:style>
-          <a:lnRef idx="1">
-            <a:schemeClr val="dk1"/>
-          </a:lnRef>
-          <a:fillRef idx="0">
-            <a:schemeClr val="dk1"/>
-          </a:fillRef>
-          <a:effectRef idx="0">
-            <a:schemeClr val="dk1"/>
-          </a:effectRef>
-          <a:fontRef idx="minor">
-            <a:schemeClr val="tx1"/>
-          </a:fontRef>
-        </p:style>
-      </p:cxnSp>
-    </p:spTree>
-    <p:extLst>
-      <p:ext uri="{BB962C8B-B14F-4D97-AF65-F5344CB8AC3E}">
-        <p14:creationId xmlns:p14="http://schemas.microsoft.com/office/powerpoint/2010/main" val="2110676764"/>
-      </p:ext>
-    </p:extLst>
-  </p:cSld>
-  <p:clrMapOvr>
-    <a:masterClrMapping/>
-  </p:clrMapOvr>
-</p:sld>
-</file>
-
-<file path=ppt/slides/slide4.xml><?xml version="1.0" encoding="utf-8"?>
-<p:sld xmlns:a="http://schemas.openxmlformats.org/drawingml/2006/main" xmlns:r="http://schemas.openxmlformats.org/officeDocument/2006/relationships" xmlns:p="http://schemas.openxmlformats.org/presentationml/2006/main">
-  <p:cSld>
-    <p:spTree>
-      <p:nvGrpSpPr>
-        <p:cNvPr id="1" name=""/>
-        <p:cNvGrpSpPr/>
-        <p:nvPr/>
-      </p:nvGrpSpPr>
-      <p:grpSpPr>
-        <a:xfrm>
-          <a:off x="0" y="0"/>
-          <a:ext cx="0" cy="0"/>
-          <a:chOff x="0" y="0"/>
-          <a:chExt cx="0" cy="0"/>
-        </a:xfrm>
-      </p:grpSpPr>
-      <p:sp>
-        <p:nvSpPr>
-          <p:cNvPr id="2" name="Title 1"/>
-          <p:cNvSpPr>
-            <a:spLocks noGrp="1"/>
-          </p:cNvSpPr>
-          <p:nvPr>
-            <p:ph type="title"/>
-          </p:nvPr>
-        </p:nvSpPr>
-        <p:spPr>
-          <a:xfrm>
-            <a:off x="457200" y="455595"/>
             <a:ext cx="7239000" cy="685482"/>
           </a:xfrm>
         </p:spPr>
@@ -4292,7 +3967,7 @@
 </p:sld>
 </file>
 
-<file path=ppt/slides/slide5.xml><?xml version="1.0" encoding="utf-8"?>
+<file path=ppt/slides/slide4.xml><?xml version="1.0" encoding="utf-8"?>
 <p:sld xmlns:a="http://schemas.openxmlformats.org/drawingml/2006/main" xmlns:r="http://schemas.openxmlformats.org/officeDocument/2006/relationships" xmlns:p="http://schemas.openxmlformats.org/presentationml/2006/main">
   <p:cSld>
     <p:spTree>
@@ -5292,7 +4967,7 @@
 </p:sld>
 </file>
 
-<file path=ppt/slides/slide6.xml><?xml version="1.0" encoding="utf-8"?>
+<file path=ppt/slides/slide5.xml><?xml version="1.0" encoding="utf-8"?>
 <p:sld xmlns:a="http://schemas.openxmlformats.org/drawingml/2006/main" xmlns:r="http://schemas.openxmlformats.org/officeDocument/2006/relationships" xmlns:p="http://schemas.openxmlformats.org/presentationml/2006/main">
   <p:cSld>
     <p:spTree>
@@ -5534,7 +5209,7 @@
 </p:sld>
 </file>
 
-<file path=ppt/slides/slide7.xml><?xml version="1.0" encoding="utf-8"?>
+<file path=ppt/slides/slide6.xml><?xml version="1.0" encoding="utf-8"?>
 <p:sld xmlns:a="http://schemas.openxmlformats.org/drawingml/2006/main" xmlns:r="http://schemas.openxmlformats.org/officeDocument/2006/relationships" xmlns:p="http://schemas.openxmlformats.org/presentationml/2006/main">
   <p:cSld>
     <p:spTree>
@@ -5731,7 +5406,7 @@
 </p:sld>
 </file>
 
-<file path=ppt/slides/slide8.xml><?xml version="1.0" encoding="utf-8"?>
+<file path=ppt/slides/slide7.xml><?xml version="1.0" encoding="utf-8"?>
 <p:sld xmlns:a="http://schemas.openxmlformats.org/drawingml/2006/main" xmlns:r="http://schemas.openxmlformats.org/officeDocument/2006/relationships" xmlns:p="http://schemas.openxmlformats.org/presentationml/2006/main">
   <p:cSld>
     <p:spTree>
@@ -5885,7 +5560,7 @@
         </p:blipFill>
         <p:spPr bwMode="auto">
           <a:xfrm>
-            <a:off x="3220244" y="3810000"/>
+            <a:off x="1371600" y="3810000"/>
             <a:ext cx="2703512" cy="2362200"/>
           </a:xfrm>
           <a:prstGeom prst="rect">
@@ -5897,6 +5572,381 @@
           </a:ln>
         </p:spPr>
       </p:pic>
+      <p:pic>
+        <p:nvPicPr>
+          <p:cNvPr id="7" name="Picture 6" descr="C:\Users\David\Pictures\knn_bw.png">
+            <a:extLst>
+              <a:ext uri="{FF2B5EF4-FFF2-40B4-BE49-F238E27FC236}">
+                <a16:creationId xmlns:a16="http://schemas.microsoft.com/office/drawing/2014/main" xmlns="" id="{D7C26172-1B9D-44B9-89C2-7497218965D2}"/>
+              </a:ext>
+            </a:extLst>
+          </p:cNvPr>
+          <p:cNvPicPr/>
+          <p:nvPr/>
+        </p:nvPicPr>
+        <p:blipFill>
+          <a:blip r:embed="rId2">
+            <a:extLst>
+              <a:ext uri="{28A0092B-C50C-407E-A947-70E740481C1C}">
+                <a14:useLocalDpi xmlns:a14="http://schemas.microsoft.com/office/drawing/2010/main" val="0"/>
+              </a:ext>
+            </a:extLst>
+          </a:blip>
+          <a:srcRect/>
+          <a:stretch>
+            <a:fillRect/>
+          </a:stretch>
+        </p:blipFill>
+        <p:spPr bwMode="auto">
+          <a:xfrm>
+            <a:off x="4916488" y="3810000"/>
+            <a:ext cx="2703512" cy="2362200"/>
+          </a:xfrm>
+          <a:prstGeom prst="rect">
+            <a:avLst/>
+          </a:prstGeom>
+          <a:noFill/>
+          <a:ln>
+            <a:noFill/>
+          </a:ln>
+        </p:spPr>
+      </p:pic>
+      <p:pic>
+        <p:nvPicPr>
+          <p:cNvPr id="5" name="Picture 4"/>
+          <p:cNvPicPr>
+            <a:picLocks noChangeAspect="1"/>
+          </p:cNvPicPr>
+          <p:nvPr/>
+        </p:nvPicPr>
+        <p:blipFill>
+          <a:blip r:embed="rId3"/>
+          <a:stretch>
+            <a:fillRect/>
+          </a:stretch>
+        </p:blipFill>
+        <p:spPr>
+          <a:xfrm>
+            <a:off x="4898571" y="4038943"/>
+            <a:ext cx="228571" cy="190476"/>
+          </a:xfrm>
+          <a:prstGeom prst="rect">
+            <a:avLst/>
+          </a:prstGeom>
+        </p:spPr>
+      </p:pic>
+      <p:pic>
+        <p:nvPicPr>
+          <p:cNvPr id="9" name="Picture 8"/>
+          <p:cNvPicPr>
+            <a:picLocks noChangeAspect="1"/>
+          </p:cNvPicPr>
+          <p:nvPr/>
+        </p:nvPicPr>
+        <p:blipFill>
+          <a:blip r:embed="rId3"/>
+          <a:stretch>
+            <a:fillRect/>
+          </a:stretch>
+        </p:blipFill>
+        <p:spPr>
+          <a:xfrm>
+            <a:off x="5836315" y="3853777"/>
+            <a:ext cx="228571" cy="190476"/>
+          </a:xfrm>
+          <a:prstGeom prst="rect">
+            <a:avLst/>
+          </a:prstGeom>
+        </p:spPr>
+      </p:pic>
+      <p:pic>
+        <p:nvPicPr>
+          <p:cNvPr id="10" name="Picture 9"/>
+          <p:cNvPicPr>
+            <a:picLocks noChangeAspect="1"/>
+          </p:cNvPicPr>
+          <p:nvPr/>
+        </p:nvPicPr>
+        <p:blipFill>
+          <a:blip r:embed="rId3"/>
+          <a:stretch>
+            <a:fillRect/>
+          </a:stretch>
+        </p:blipFill>
+        <p:spPr>
+          <a:xfrm>
+            <a:off x="6613871" y="3810000"/>
+            <a:ext cx="228571" cy="190476"/>
+          </a:xfrm>
+          <a:prstGeom prst="rect">
+            <a:avLst/>
+          </a:prstGeom>
+        </p:spPr>
+      </p:pic>
+      <p:pic>
+        <p:nvPicPr>
+          <p:cNvPr id="11" name="Picture 10"/>
+          <p:cNvPicPr>
+            <a:picLocks noChangeAspect="1"/>
+          </p:cNvPicPr>
+          <p:nvPr/>
+        </p:nvPicPr>
+        <p:blipFill>
+          <a:blip r:embed="rId3"/>
+          <a:stretch>
+            <a:fillRect/>
+          </a:stretch>
+        </p:blipFill>
+        <p:spPr>
+          <a:xfrm>
+            <a:off x="7315200" y="4044253"/>
+            <a:ext cx="228571" cy="190476"/>
+          </a:xfrm>
+          <a:prstGeom prst="rect">
+            <a:avLst/>
+          </a:prstGeom>
+        </p:spPr>
+      </p:pic>
+      <p:pic>
+        <p:nvPicPr>
+          <p:cNvPr id="12" name="Picture 11"/>
+          <p:cNvPicPr>
+            <a:picLocks noChangeAspect="1"/>
+          </p:cNvPicPr>
+          <p:nvPr/>
+        </p:nvPicPr>
+        <p:blipFill>
+          <a:blip r:embed="rId3"/>
+          <a:stretch>
+            <a:fillRect/>
+          </a:stretch>
+        </p:blipFill>
+        <p:spPr>
+          <a:xfrm>
+            <a:off x="4898571" y="4724400"/>
+            <a:ext cx="228571" cy="190476"/>
+          </a:xfrm>
+          <a:prstGeom prst="rect">
+            <a:avLst/>
+          </a:prstGeom>
+        </p:spPr>
+      </p:pic>
+      <p:pic>
+        <p:nvPicPr>
+          <p:cNvPr id="13" name="Picture 12"/>
+          <p:cNvPicPr>
+            <a:picLocks noChangeAspect="1"/>
+          </p:cNvPicPr>
+          <p:nvPr/>
+        </p:nvPicPr>
+        <p:blipFill>
+          <a:blip r:embed="rId3"/>
+          <a:stretch>
+            <a:fillRect/>
+          </a:stretch>
+        </p:blipFill>
+        <p:spPr>
+          <a:xfrm>
+            <a:off x="4875226" y="5035378"/>
+            <a:ext cx="228571" cy="190476"/>
+          </a:xfrm>
+          <a:prstGeom prst="rect">
+            <a:avLst/>
+          </a:prstGeom>
+        </p:spPr>
+      </p:pic>
+      <p:pic>
+        <p:nvPicPr>
+          <p:cNvPr id="14" name="Picture 13"/>
+          <p:cNvPicPr>
+            <a:picLocks noChangeAspect="1"/>
+          </p:cNvPicPr>
+          <p:nvPr/>
+        </p:nvPicPr>
+        <p:blipFill>
+          <a:blip r:embed="rId3"/>
+          <a:stretch>
+            <a:fillRect/>
+          </a:stretch>
+        </p:blipFill>
+        <p:spPr>
+          <a:xfrm>
+            <a:off x="5334000" y="4705669"/>
+            <a:ext cx="228571" cy="190476"/>
+          </a:xfrm>
+          <a:prstGeom prst="rect">
+            <a:avLst/>
+          </a:prstGeom>
+        </p:spPr>
+      </p:pic>
+      <p:pic>
+        <p:nvPicPr>
+          <p:cNvPr id="15" name="Picture 14"/>
+          <p:cNvPicPr>
+            <a:picLocks noChangeAspect="1"/>
+          </p:cNvPicPr>
+          <p:nvPr/>
+        </p:nvPicPr>
+        <p:blipFill>
+          <a:blip r:embed="rId3"/>
+          <a:stretch>
+            <a:fillRect/>
+          </a:stretch>
+        </p:blipFill>
+        <p:spPr>
+          <a:xfrm>
+            <a:off x="5722029" y="5022997"/>
+            <a:ext cx="228571" cy="190476"/>
+          </a:xfrm>
+          <a:prstGeom prst="rect">
+            <a:avLst/>
+          </a:prstGeom>
+        </p:spPr>
+      </p:pic>
+      <p:pic>
+        <p:nvPicPr>
+          <p:cNvPr id="16" name="Picture 15"/>
+          <p:cNvPicPr>
+            <a:picLocks noChangeAspect="1"/>
+          </p:cNvPicPr>
+          <p:nvPr/>
+        </p:nvPicPr>
+        <p:blipFill>
+          <a:blip r:embed="rId3"/>
+          <a:stretch>
+            <a:fillRect/>
+          </a:stretch>
+        </p:blipFill>
+        <p:spPr>
+          <a:xfrm>
+            <a:off x="6478559" y="4844902"/>
+            <a:ext cx="228571" cy="190476"/>
+          </a:xfrm>
+          <a:prstGeom prst="rect">
+            <a:avLst/>
+          </a:prstGeom>
+        </p:spPr>
+      </p:pic>
+      <p:pic>
+        <p:nvPicPr>
+          <p:cNvPr id="17" name="Picture 16"/>
+          <p:cNvPicPr>
+            <a:picLocks noChangeAspect="1"/>
+          </p:cNvPicPr>
+          <p:nvPr/>
+        </p:nvPicPr>
+        <p:blipFill>
+          <a:blip r:embed="rId3"/>
+          <a:stretch>
+            <a:fillRect/>
+          </a:stretch>
+        </p:blipFill>
+        <p:spPr>
+          <a:xfrm>
+            <a:off x="6385300" y="5105854"/>
+            <a:ext cx="228571" cy="190476"/>
+          </a:xfrm>
+          <a:prstGeom prst="rect">
+            <a:avLst/>
+          </a:prstGeom>
+        </p:spPr>
+      </p:pic>
+      <p:pic>
+        <p:nvPicPr>
+          <p:cNvPr id="18" name="Picture 17"/>
+          <p:cNvPicPr>
+            <a:picLocks noChangeAspect="1"/>
+          </p:cNvPicPr>
+          <p:nvPr/>
+        </p:nvPicPr>
+        <p:blipFill>
+          <a:blip r:embed="rId3"/>
+          <a:stretch>
+            <a:fillRect/>
+          </a:stretch>
+        </p:blipFill>
+        <p:spPr>
+          <a:xfrm>
+            <a:off x="6340261" y="5175218"/>
+            <a:ext cx="228571" cy="190476"/>
+          </a:xfrm>
+          <a:prstGeom prst="rect">
+            <a:avLst/>
+          </a:prstGeom>
+        </p:spPr>
+      </p:pic>
+      <p:pic>
+        <p:nvPicPr>
+          <p:cNvPr id="6" name="Picture 5"/>
+          <p:cNvPicPr>
+            <a:picLocks noChangeAspect="1"/>
+          </p:cNvPicPr>
+          <p:nvPr/>
+        </p:nvPicPr>
+        <p:blipFill>
+          <a:blip r:embed="rId4"/>
+          <a:stretch>
+            <a:fillRect/>
+          </a:stretch>
+        </p:blipFill>
+        <p:spPr>
+          <a:xfrm>
+            <a:off x="6443219" y="5304392"/>
+            <a:ext cx="166875" cy="159619"/>
+          </a:xfrm>
+          <a:prstGeom prst="rect">
+            <a:avLst/>
+          </a:prstGeom>
+        </p:spPr>
+      </p:pic>
+      <p:sp>
+        <p:nvSpPr>
+          <p:cNvPr id="19" name="Right Arrow 18"/>
+          <p:cNvSpPr/>
+          <p:nvPr/>
+        </p:nvSpPr>
+        <p:spPr>
+          <a:xfrm>
+            <a:off x="4075112" y="4800907"/>
+            <a:ext cx="937744" cy="424947"/>
+          </a:xfrm>
+          <a:prstGeom prst="rightArrow">
+            <a:avLst/>
+          </a:prstGeom>
+          <a:solidFill>
+            <a:schemeClr val="tx1"/>
+          </a:solidFill>
+          <a:ln>
+            <a:solidFill>
+              <a:schemeClr val="tx1"/>
+            </a:solidFill>
+          </a:ln>
+        </p:spPr>
+        <p:style>
+          <a:lnRef idx="2">
+            <a:schemeClr val="accent1">
+              <a:shade val="50000"/>
+            </a:schemeClr>
+          </a:lnRef>
+          <a:fillRef idx="1">
+            <a:schemeClr val="accent1"/>
+          </a:fillRef>
+          <a:effectRef idx="0">
+            <a:schemeClr val="accent1"/>
+          </a:effectRef>
+          <a:fontRef idx="minor">
+            <a:schemeClr val="lt1"/>
+          </a:fontRef>
+        </p:style>
+        <p:txBody>
+          <a:bodyPr rtlCol="0" anchor="ctr"/>
+          <a:lstStyle/>
+          <a:p>
+            <a:pPr algn="ctr"/>
+            <a:endParaRPr lang="en-US"/>
+          </a:p>
+        </p:txBody>
+      </p:sp>
     </p:spTree>
     <p:extLst>
       <p:ext uri="{BB962C8B-B14F-4D97-AF65-F5344CB8AC3E}">
@@ -5910,7 +5960,7 @@
 </p:sld>
 </file>
 
-<file path=ppt/slides/slide9.xml><?xml version="1.0" encoding="utf-8"?>
+<file path=ppt/slides/slide8.xml><?xml version="1.0" encoding="utf-8"?>
 <p:sld xmlns:a="http://schemas.openxmlformats.org/drawingml/2006/main" xmlns:r="http://schemas.openxmlformats.org/officeDocument/2006/relationships" xmlns:p="http://schemas.openxmlformats.org/presentationml/2006/main">
   <p:cSld>
     <p:spTree>
@@ -6233,6 +6283,133 @@
     <p:extLst>
       <p:ext uri="{BB962C8B-B14F-4D97-AF65-F5344CB8AC3E}">
         <p14:creationId xmlns:p14="http://schemas.microsoft.com/office/powerpoint/2010/main" val="3317623833"/>
+      </p:ext>
+    </p:extLst>
+  </p:cSld>
+  <p:clrMapOvr>
+    <a:masterClrMapping/>
+  </p:clrMapOvr>
+</p:sld>
+</file>
+
+<file path=ppt/slides/slide9.xml><?xml version="1.0" encoding="utf-8"?>
+<p:sld xmlns:a="http://schemas.openxmlformats.org/drawingml/2006/main" xmlns:r="http://schemas.openxmlformats.org/officeDocument/2006/relationships" xmlns:p="http://schemas.openxmlformats.org/presentationml/2006/main">
+  <p:cSld>
+    <p:spTree>
+      <p:nvGrpSpPr>
+        <p:cNvPr id="1" name=""/>
+        <p:cNvGrpSpPr/>
+        <p:nvPr/>
+      </p:nvGrpSpPr>
+      <p:grpSpPr>
+        <a:xfrm>
+          <a:off x="0" y="0"/>
+          <a:ext cx="0" cy="0"/>
+          <a:chOff x="0" y="0"/>
+          <a:chExt cx="0" cy="0"/>
+        </a:xfrm>
+      </p:grpSpPr>
+      <p:sp>
+        <p:nvSpPr>
+          <p:cNvPr id="2" name="Title 1"/>
+          <p:cNvSpPr>
+            <a:spLocks noGrp="1"/>
+          </p:cNvSpPr>
+          <p:nvPr>
+            <p:ph type="title"/>
+          </p:nvPr>
+        </p:nvSpPr>
+        <p:spPr>
+          <a:xfrm>
+            <a:off x="457200" y="455595"/>
+            <a:ext cx="7162800" cy="685482"/>
+          </a:xfrm>
+        </p:spPr>
+        <p:txBody>
+          <a:bodyPr anchor="t">
+            <a:normAutofit/>
+          </a:bodyPr>
+          <a:lstStyle/>
+          <a:p>
+            <a:r>
+              <a:rPr lang="en-US" sz="2800" b="1" cap="small" dirty="0">
+                <a:solidFill>
+                  <a:schemeClr val="tx1"/>
+                </a:solidFill>
+              </a:rPr>
+              <a:t>Neural Network</a:t>
+            </a:r>
+            <a:endParaRPr lang="en-US" sz="2000" b="1" cap="small" dirty="0">
+              <a:solidFill>
+                <a:schemeClr val="tx1"/>
+              </a:solidFill>
+            </a:endParaRPr>
+          </a:p>
+        </p:txBody>
+      </p:sp>
+      <p:sp>
+        <p:nvSpPr>
+          <p:cNvPr id="3" name="Content Placeholder 2"/>
+          <p:cNvSpPr>
+            <a:spLocks noGrp="1"/>
+          </p:cNvSpPr>
+          <p:nvPr>
+            <p:ph idx="1"/>
+          </p:nvPr>
+        </p:nvSpPr>
+        <p:spPr>
+          <a:xfrm>
+            <a:off x="457200" y="1531618"/>
+            <a:ext cx="7620000" cy="5135563"/>
+          </a:xfrm>
+        </p:spPr>
+        <p:txBody>
+          <a:bodyPr/>
+          <a:lstStyle/>
+          <a:p>
+            <a:pPr marL="342900" indent="-342900">
+              <a:buFont typeface="Arial" panose="020B0604020202020204" pitchFamily="34" charset="0"/>
+              <a:buChar char="•"/>
+            </a:pPr>
+            <a:endParaRPr lang="en-US" b="0" dirty="0"/>
+          </a:p>
+        </p:txBody>
+      </p:sp>
+      <p:cxnSp>
+        <p:nvCxnSpPr>
+          <p:cNvPr id="4" name="Straight Connector 3"/>
+          <p:cNvCxnSpPr/>
+          <p:nvPr/>
+        </p:nvCxnSpPr>
+        <p:spPr>
+          <a:xfrm>
+            <a:off x="0" y="1371600"/>
+            <a:ext cx="7848600" cy="0"/>
+          </a:xfrm>
+          <a:prstGeom prst="line">
+            <a:avLst/>
+          </a:prstGeom>
+          <a:ln w="57150"/>
+        </p:spPr>
+        <p:style>
+          <a:lnRef idx="1">
+            <a:schemeClr val="dk1"/>
+          </a:lnRef>
+          <a:fillRef idx="0">
+            <a:schemeClr val="dk1"/>
+          </a:fillRef>
+          <a:effectRef idx="0">
+            <a:schemeClr val="dk1"/>
+          </a:effectRef>
+          <a:fontRef idx="minor">
+            <a:schemeClr val="tx1"/>
+          </a:fontRef>
+        </p:style>
+      </p:cxnSp>
+    </p:spTree>
+    <p:extLst>
+      <p:ext uri="{BB962C8B-B14F-4D97-AF65-F5344CB8AC3E}">
+        <p14:creationId xmlns:p14="http://schemas.microsoft.com/office/powerpoint/2010/main" val="2045246655"/>
       </p:ext>
     </p:extLst>
   </p:cSld>

</xml_diff>